<commit_message>
new image for heat2d
</commit_message>
<xml_diff>
--- a/tutorial/adios_api_scidac_tutorial.pptx
+++ b/tutorial/adios_api_scidac_tutorial.pptx
@@ -264,7 +264,7 @@
           <c:xMode val="edge"/>
           <c:yMode val="edge"/>
           <c:x val="0.18219487781418628"/>
-          <c:y val="4.3726235741444894E-2"/>
+          <c:y val="4.3726235741444901E-2"/>
         </c:manualLayout>
       </c:layout>
       <c:spPr>
@@ -280,10 +280,10 @@
           <c:layoutTarget val="inner"/>
           <c:xMode val="edge"/>
           <c:yMode val="edge"/>
-          <c:x val="9.358191095678263E-2"/>
+          <c:x val="9.3581910956782671E-2"/>
           <c:y val="0.14005089667974013"/>
-          <c:w val="0.87502652894194655"/>
-          <c:h val="0.80164825404429052"/>
+          <c:w val="0.87502652894194644"/>
+          <c:h val="0.80164825404429074"/>
         </c:manualLayout>
       </c:layout>
       <c:lineChart>
@@ -364,7 +364,7 @@
                     <c:v>1.7737918165270918</c:v>
                   </c:pt>
                   <c:pt idx="4">
-                    <c:v>4.4249960267891622</c:v>
+                    <c:v>4.4249960267891613</c:v>
                   </c:pt>
                 </c:numCache>
               </c:numRef>
@@ -409,10 +409,10 @@
                 <c:formatCode>General</c:formatCode>
                 <c:ptCount val="5"/>
                 <c:pt idx="0">
-                  <c:v>0.70800000000000018</c:v>
+                  <c:v>0.7080000000000003</c:v>
                 </c:pt>
                 <c:pt idx="1">
-                  <c:v>1.1640890000000004</c:v>
+                  <c:v>1.1640890000000006</c:v>
                 </c:pt>
                 <c:pt idx="2">
                   <c:v>4.2899250000000002</c:v>
@@ -478,13 +478,13 @@
                     <c:v>1.0707783852825514</c:v>
                   </c:pt>
                   <c:pt idx="1">
-                    <c:v>1.8770895611838345</c:v>
+                    <c:v>1.8770895611838347</c:v>
                   </c:pt>
                   <c:pt idx="2">
                     <c:v>1.4763311688777003</c:v>
                   </c:pt>
                   <c:pt idx="3">
-                    <c:v>2.2778163457214347</c:v>
+                    <c:v>2.2778163457214355</c:v>
                   </c:pt>
                   <c:pt idx="4">
                     <c:v>3.2392632943539574</c:v>
@@ -514,10 +514,10 @@
                   <c:v>3.642884</c:v>
                 </c:pt>
                 <c:pt idx="2">
-                  <c:v>5.8479389999999976</c:v>
+                  <c:v>5.8479389999999967</c:v>
                 </c:pt>
                 <c:pt idx="3">
-                  <c:v>10.661818</c:v>
+                  <c:v>10.661817999999998</c:v>
                 </c:pt>
                 <c:pt idx="4">
                   <c:v>23.943885000000005</c:v>
@@ -577,13 +577,13 @@
                     <c:v>0.13900006187538741</c:v>
                   </c:pt>
                   <c:pt idx="1">
-                    <c:v>0.59399468138899181</c:v>
+                    <c:v>0.59399468138899192</c:v>
                   </c:pt>
                   <c:pt idx="2">
-                    <c:v>0.22394344738602556</c:v>
+                    <c:v>0.22394344738602565</c:v>
                   </c:pt>
                   <c:pt idx="3">
-                    <c:v>1.3891887383406218</c:v>
+                    <c:v>1.3891887383406221</c:v>
                   </c:pt>
                   <c:pt idx="4">
                     <c:v>6.1668382141811273</c:v>
@@ -607,16 +607,16 @@
                 <c:formatCode>General</c:formatCode>
                 <c:ptCount val="5"/>
                 <c:pt idx="0">
-                  <c:v>9.9104000000000053E-2</c:v>
+                  <c:v>9.9104000000000081E-2</c:v>
                 </c:pt>
                 <c:pt idx="1">
-                  <c:v>0.21428600000000006</c:v>
+                  <c:v>0.21428600000000009</c:v>
                 </c:pt>
                 <c:pt idx="2">
-                  <c:v>0.47008800000000012</c:v>
+                  <c:v>0.47008800000000017</c:v>
                 </c:pt>
                 <c:pt idx="3">
-                  <c:v>0.84351199999999982</c:v>
+                  <c:v>0.84351199999999971</c:v>
                 </c:pt>
                 <c:pt idx="4">
                   <c:v>1.6610259999999999</c:v>
@@ -671,16 +671,16 @@
                   <c:formatCode>General</c:formatCode>
                   <c:ptCount val="5"/>
                   <c:pt idx="0">
-                    <c:v>3.7100375058413952</c:v>
+                    <c:v>3.7100375058413957</c:v>
                   </c:pt>
                   <c:pt idx="1">
                     <c:v>183.36547487817586</c:v>
                   </c:pt>
                   <c:pt idx="2">
-                    <c:v>12.500458366067095</c:v>
+                    <c:v>12.500458366067097</c:v>
                   </c:pt>
                   <c:pt idx="3">
-                    <c:v>156.95443975170369</c:v>
+                    <c:v>156.95443975170372</c:v>
                   </c:pt>
                   <c:pt idx="4">
                     <c:v>69.480436640903747</c:v>
@@ -707,7 +707,7 @@
                   <c:v>14.079898</c:v>
                 </c:pt>
                 <c:pt idx="1">
-                  <c:v>31.378701999999993</c:v>
+                  <c:v>31.37870199999999</c:v>
                 </c:pt>
                 <c:pt idx="2">
                   <c:v>75.383114000000006</c:v>
@@ -723,11 +723,11 @@
           </c:val>
         </c:ser>
         <c:marker val="1"/>
-        <c:axId val="85497728"/>
-        <c:axId val="85499264"/>
+        <c:axId val="76752768"/>
+        <c:axId val="76754944"/>
       </c:lineChart>
       <c:catAx>
-        <c:axId val="85497728"/>
+        <c:axId val="76752768"/>
         <c:scaling>
           <c:orientation val="minMax"/>
         </c:scaling>
@@ -759,8 +759,8 @@
             <c:manualLayout>
               <c:xMode val="edge"/>
               <c:yMode val="edge"/>
-              <c:x val="0.39627353228936146"/>
-              <c:y val="0.88783352378795155"/>
+              <c:x val="0.39627353228936152"/>
+              <c:y val="0.88783352378795144"/>
             </c:manualLayout>
           </c:layout>
           <c:spPr>
@@ -797,7 +797,7 @@
             <a:endParaRPr lang="en-US"/>
           </a:p>
         </c:txPr>
-        <c:crossAx val="85499264"/>
+        <c:crossAx val="76754944"/>
         <c:crosses val="autoZero"/>
         <c:auto val="1"/>
         <c:lblAlgn val="ctr"/>
@@ -806,7 +806,7 @@
         <c:tickMarkSkip val="2"/>
       </c:catAx>
       <c:valAx>
-        <c:axId val="85499264"/>
+        <c:axId val="76754944"/>
         <c:scaling>
           <c:logBase val="10"/>
           <c:orientation val="minMax"/>
@@ -849,8 +849,8 @@
             <c:manualLayout>
               <c:xMode val="edge"/>
               <c:yMode val="edge"/>
-              <c:x val="6.2111838916827826E-3"/>
-              <c:y val="0.28517136738371085"/>
+              <c:x val="6.2111838916827844E-3"/>
+              <c:y val="0.28517136738371091"/>
             </c:manualLayout>
           </c:layout>
           <c:spPr>
@@ -887,7 +887,7 @@
             <a:endParaRPr lang="en-US"/>
           </a:p>
         </c:txPr>
-        <c:crossAx val="85497728"/>
+        <c:crossAx val="76752768"/>
         <c:crossesAt val="1"/>
         <c:crossBetween val="between"/>
       </c:valAx>
@@ -908,7 +908,7 @@
           <c:xMode val="edge"/>
           <c:yMode val="edge"/>
           <c:x val="0.13845610024553381"/>
-          <c:y val="0.1654000379230163"/>
+          <c:y val="0.16540003792301633"/>
           <c:w val="0.41366484718607288"/>
           <c:h val="4.5627418781393682E-2"/>
         </c:manualLayout>
@@ -6038,11 +6038,7 @@
             </a:pPr>
             <a:r>
               <a:rPr lang="en-US" sz="1700" dirty="0" smtClean="0"/>
-              <a:t>C </a:t>
-            </a:r>
-            <a:r>
-              <a:rPr lang="en-US" sz="1700" dirty="0" smtClean="0"/>
-              <a:t>compiler</a:t>
+              <a:t>C compiler</a:t>
             </a:r>
           </a:p>
           <a:p>
@@ -6066,7 +6062,6 @@
               <a:rPr lang="en-US" sz="1700" dirty="0" smtClean="0"/>
               <a:t>python.</a:t>
             </a:r>
-            <a:endParaRPr lang="en-US" sz="1700" dirty="0" smtClean="0"/>
           </a:p>
           <a:p>
             <a:pPr lvl="1">
@@ -6175,13 +6170,8 @@
             </a:r>
             <a:r>
               <a:rPr lang="en-US" dirty="0" smtClean="0"/>
-              <a:t> </a:t>
-            </a:r>
-            <a:r>
-              <a:rPr lang="en-US" dirty="0" smtClean="0"/>
-              <a:t>P will be fully supported.</a:t>
-            </a:r>
-            <a:endParaRPr lang="en-US" dirty="0" smtClean="0"/>
+              <a:t> P will be fully supported.</a:t>
+            </a:r>
           </a:p>
           <a:p>
             <a:pPr>
@@ -6252,11 +6242,7 @@
             </a:pPr>
             <a:r>
               <a:rPr lang="en-US" dirty="0" smtClean="0"/>
-              <a:t>Integration </a:t>
-            </a:r>
-            <a:r>
-              <a:rPr lang="en-US" dirty="0" smtClean="0"/>
-              <a:t>into Kepler for</a:t>
+              <a:t>Integration into Kepler for</a:t>
             </a:r>
             <a:br>
               <a:rPr lang="en-US" dirty="0" smtClean="0"/>
@@ -6265,7 +6251,6 @@
               <a:rPr lang="en-US" dirty="0" smtClean="0"/>
               <a:t>metadata capture.</a:t>
             </a:r>
-            <a:endParaRPr lang="en-US" dirty="0" smtClean="0"/>
           </a:p>
           <a:p>
             <a:pPr>
@@ -6287,11 +6272,7 @@
             </a:br>
             <a:r>
               <a:rPr lang="en-US" dirty="0" smtClean="0"/>
-              <a:t>such as data </a:t>
-            </a:r>
-            <a:r>
-              <a:rPr lang="en-US" dirty="0" smtClean="0"/>
-              <a:t>re-arrangement and in situ</a:t>
+              <a:t>such as data re-arrangement and in situ</a:t>
             </a:r>
             <a:br>
               <a:rPr lang="en-US" dirty="0" smtClean="0"/>
@@ -6300,7 +6281,6 @@
               <a:rPr lang="en-US" dirty="0" smtClean="0"/>
               <a:t>visualization.</a:t>
             </a:r>
-            <a:endParaRPr lang="en-US" dirty="0" smtClean="0"/>
           </a:p>
           <a:p>
             <a:pPr>
@@ -13052,7 +13032,7 @@
       </p:sp>
       <p:pic>
         <p:nvPicPr>
-          <p:cNvPr id="58370" name="Picture 6" descr="u0010.png"/>
+          <p:cNvPr id="4" name="Picture 3" descr="heat.jpg"/>
           <p:cNvPicPr>
             <a:picLocks noChangeAspect="1"/>
           </p:cNvPicPr>
@@ -13060,26 +13040,18 @@
         </p:nvPicPr>
         <p:blipFill>
           <a:blip r:embed="rId2"/>
-          <a:srcRect/>
           <a:stretch>
             <a:fillRect/>
           </a:stretch>
         </p:blipFill>
-        <p:spPr bwMode="auto">
+        <p:spPr>
           <a:xfrm>
-            <a:off x="2209800" y="1524000"/>
-            <a:ext cx="4800600" cy="4273550"/>
+            <a:off x="2057400" y="990600"/>
+            <a:ext cx="5334000" cy="5334000"/>
           </a:xfrm>
           <a:prstGeom prst="rect">
             <a:avLst/>
           </a:prstGeom>
-          <a:noFill/>
-          <a:ln w="9525">
-            <a:noFill/>
-            <a:miter lim="800000"/>
-            <a:headEnd/>
-            <a:tailEnd/>
-          </a:ln>
         </p:spPr>
       </p:pic>
     </p:spTree>

</xml_diff>